<commit_message>
fix fetch stop_times, import bixi od, nb bus trips going through list of stops
</commit_message>
<xml_diff>
--- a/Présentation HackQC17.pptx
+++ b/Présentation HackQC17.pptx
@@ -9,8 +9,8 @@
   </p:notesMasterIdLst>
   <p:sldIdLst>
     <p:sldId id="257" r:id="rId2"/>
-    <p:sldId id="315" r:id="rId3"/>
-    <p:sldId id="282" r:id="rId4"/>
+    <p:sldId id="282" r:id="rId3"/>
+    <p:sldId id="315" r:id="rId4"/>
     <p:sldId id="317" r:id="rId5"/>
     <p:sldId id="320" r:id="rId6"/>
     <p:sldId id="319" r:id="rId7"/>
@@ -1679,6 +1679,1235 @@
       <dsp:cNvGrpSpPr/>
     </dsp:nvGrpSpPr>
     <dsp:grpSpPr/>
+    <dsp:sp modelId="{9E45D6B8-AD53-426D-9CD8-A9D41CFD926D}">
+      <dsp:nvSpPr>
+        <dsp:cNvPr id="0" name=""/>
+        <dsp:cNvSpPr/>
+      </dsp:nvSpPr>
+      <dsp:spPr>
+        <a:xfrm>
+          <a:off x="3482376" y="2365638"/>
+          <a:ext cx="1561376" cy="1561376"/>
+        </a:xfrm>
+        <a:prstGeom prst="ellipse">
+          <a:avLst/>
+        </a:prstGeom>
+        <a:solidFill>
+          <a:schemeClr val="lt1"/>
+        </a:solidFill>
+        <a:ln w="12700" cap="flat" cmpd="sng" algn="ctr">
+          <a:solidFill>
+            <a:schemeClr val="accent1"/>
+          </a:solidFill>
+          <a:prstDash val="solid"/>
+        </a:ln>
+        <a:effectLst/>
+      </dsp:spPr>
+      <dsp:style>
+        <a:lnRef idx="2">
+          <a:schemeClr val="accent1"/>
+        </a:lnRef>
+        <a:fillRef idx="1">
+          <a:schemeClr val="lt1"/>
+        </a:fillRef>
+        <a:effectRef idx="0">
+          <a:schemeClr val="accent1"/>
+        </a:effectRef>
+        <a:fontRef idx="minor">
+          <a:schemeClr val="dk1"/>
+        </a:fontRef>
+      </dsp:style>
+      <dsp:txBody>
+        <a:bodyPr spcFirstLastPara="0" vert="horz" wrap="square" lIns="11430" tIns="11430" rIns="11430" bIns="11430" numCol="1" spcCol="1270" anchor="ctr" anchorCtr="0">
+          <a:noAutofit/>
+        </a:bodyPr>
+        <a:lstStyle/>
+        <a:p>
+          <a:pPr lvl="0" algn="ctr" defTabSz="800100">
+            <a:lnSpc>
+              <a:spcPct val="90000"/>
+            </a:lnSpc>
+            <a:spcBef>
+              <a:spcPct val="0"/>
+            </a:spcBef>
+            <a:spcAft>
+              <a:spcPct val="35000"/>
+            </a:spcAft>
+          </a:pPr>
+          <a:r>
+            <a:rPr lang="fr-FR" sz="1800" b="1" kern="1200" dirty="0" smtClean="0"/>
+            <a:t> </a:t>
+          </a:r>
+          <a:endParaRPr lang="fr-FR" sz="1800" b="1" kern="1200" dirty="0"/>
+        </a:p>
+      </dsp:txBody>
+      <dsp:txXfrm>
+        <a:off x="3711034" y="2594296"/>
+        <a:ext cx="1104060" cy="1104060"/>
+      </dsp:txXfrm>
+    </dsp:sp>
+    <dsp:sp modelId="{9B8EFC9E-D689-414B-8105-BA2D53768CE8}">
+      <dsp:nvSpPr>
+        <dsp:cNvPr id="0" name=""/>
+        <dsp:cNvSpPr/>
+      </dsp:nvSpPr>
+      <dsp:spPr>
+        <a:xfrm rot="16200000">
+          <a:off x="3871924" y="1958016"/>
+          <a:ext cx="782280" cy="32963"/>
+        </a:xfrm>
+        <a:custGeom>
+          <a:avLst/>
+          <a:gdLst/>
+          <a:ahLst/>
+          <a:cxnLst/>
+          <a:rect l="0" t="0" r="0" b="0"/>
+          <a:pathLst>
+            <a:path>
+              <a:moveTo>
+                <a:pt x="0" y="16481"/>
+              </a:moveTo>
+              <a:lnTo>
+                <a:pt x="782280" y="16481"/>
+              </a:lnTo>
+            </a:path>
+          </a:pathLst>
+        </a:custGeom>
+        <a:noFill/>
+        <a:ln w="12700" cap="flat" cmpd="sng" algn="ctr">
+          <a:solidFill>
+            <a:schemeClr val="dk2">
+              <a:shade val="60000"/>
+              <a:hueOff val="0"/>
+              <a:satOff val="0"/>
+              <a:lumOff val="0"/>
+              <a:alphaOff val="0"/>
+            </a:schemeClr>
+          </a:solidFill>
+          <a:prstDash val="solid"/>
+        </a:ln>
+        <a:effectLst/>
+      </dsp:spPr>
+      <dsp:style>
+        <a:lnRef idx="2">
+          <a:scrgbClr r="0" g="0" b="0"/>
+        </a:lnRef>
+        <a:fillRef idx="0">
+          <a:scrgbClr r="0" g="0" b="0"/>
+        </a:fillRef>
+        <a:effectRef idx="0">
+          <a:scrgbClr r="0" g="0" b="0"/>
+        </a:effectRef>
+        <a:fontRef idx="minor"/>
+      </dsp:style>
+      <dsp:txBody>
+        <a:bodyPr spcFirstLastPara="0" vert="horz" wrap="square" lIns="12700" tIns="0" rIns="12700" bIns="0" numCol="1" spcCol="1270" anchor="ctr" anchorCtr="0">
+          <a:noAutofit/>
+        </a:bodyPr>
+        <a:lstStyle/>
+        <a:p>
+          <a:pPr lvl="0" algn="ctr" defTabSz="800100">
+            <a:lnSpc>
+              <a:spcPct val="90000"/>
+            </a:lnSpc>
+            <a:spcBef>
+              <a:spcPct val="0"/>
+            </a:spcBef>
+            <a:spcAft>
+              <a:spcPct val="35000"/>
+            </a:spcAft>
+          </a:pPr>
+          <a:endParaRPr lang="fr-FR" sz="1800" b="1" kern="1200"/>
+        </a:p>
+      </dsp:txBody>
+      <dsp:txXfrm>
+        <a:off x="4243507" y="1954940"/>
+        <a:ext cx="39114" cy="39114"/>
+      </dsp:txXfrm>
+    </dsp:sp>
+    <dsp:sp modelId="{4AABAE62-596D-431F-8A21-D6DB55E0C694}">
+      <dsp:nvSpPr>
+        <dsp:cNvPr id="0" name=""/>
+        <dsp:cNvSpPr/>
+      </dsp:nvSpPr>
+      <dsp:spPr>
+        <a:xfrm>
+          <a:off x="3482376" y="21981"/>
+          <a:ext cx="1561376" cy="1561376"/>
+        </a:xfrm>
+        <a:prstGeom prst="ellipse">
+          <a:avLst/>
+        </a:prstGeom>
+        <a:solidFill>
+          <a:schemeClr val="lt1">
+            <a:hueOff val="0"/>
+            <a:satOff val="0"/>
+            <a:lumOff val="0"/>
+            <a:alphaOff val="0"/>
+          </a:schemeClr>
+        </a:solidFill>
+        <a:ln w="12700" cap="flat" cmpd="sng" algn="ctr">
+          <a:solidFill>
+            <a:schemeClr val="dk2">
+              <a:shade val="80000"/>
+              <a:hueOff val="0"/>
+              <a:satOff val="0"/>
+              <a:lumOff val="0"/>
+              <a:alphaOff val="0"/>
+            </a:schemeClr>
+          </a:solidFill>
+          <a:prstDash val="solid"/>
+        </a:ln>
+        <a:effectLst/>
+      </dsp:spPr>
+      <dsp:style>
+        <a:lnRef idx="2">
+          <a:scrgbClr r="0" g="0" b="0"/>
+        </a:lnRef>
+        <a:fillRef idx="1">
+          <a:scrgbClr r="0" g="0" b="0"/>
+        </a:fillRef>
+        <a:effectRef idx="0">
+          <a:scrgbClr r="0" g="0" b="0"/>
+        </a:effectRef>
+        <a:fontRef idx="minor">
+          <a:schemeClr val="lt1"/>
+        </a:fontRef>
+      </dsp:style>
+      <dsp:txBody>
+        <a:bodyPr spcFirstLastPara="0" vert="horz" wrap="square" lIns="11430" tIns="11430" rIns="11430" bIns="11430" numCol="1" spcCol="1270" anchor="ctr" anchorCtr="0">
+          <a:noAutofit/>
+        </a:bodyPr>
+        <a:lstStyle/>
+        <a:p>
+          <a:pPr lvl="0" algn="ctr" defTabSz="800100">
+            <a:lnSpc>
+              <a:spcPct val="90000"/>
+            </a:lnSpc>
+            <a:spcBef>
+              <a:spcPct val="0"/>
+            </a:spcBef>
+            <a:spcAft>
+              <a:spcPct val="35000"/>
+            </a:spcAft>
+          </a:pPr>
+          <a:r>
+            <a:rPr lang="fr-FR" sz="1800" b="1" kern="1200" dirty="0" smtClean="0"/>
+            <a:t>Sherbrooke</a:t>
+          </a:r>
+          <a:br>
+            <a:rPr lang="fr-FR" sz="1800" b="1" kern="1200" dirty="0" smtClean="0"/>
+          </a:br>
+          <a:r>
+            <a:rPr lang="fr-FR" sz="1200" b="0" kern="1200" dirty="0" smtClean="0"/>
+            <a:t>106 000</a:t>
+          </a:r>
+          <a:endParaRPr lang="fr-FR" sz="1200" b="0" kern="1200" dirty="0"/>
+        </a:p>
+      </dsp:txBody>
+      <dsp:txXfrm>
+        <a:off x="3711034" y="250639"/>
+        <a:ext cx="1104060" cy="1104060"/>
+      </dsp:txXfrm>
+    </dsp:sp>
+    <dsp:sp modelId="{A0C0E97D-8C44-4E6C-9E02-2F6C35A805B5}">
+      <dsp:nvSpPr>
+        <dsp:cNvPr id="0" name=""/>
+        <dsp:cNvSpPr/>
+      </dsp:nvSpPr>
+      <dsp:spPr>
+        <a:xfrm rot="19285714">
+          <a:off x="4788096" y="2399221"/>
+          <a:ext cx="782280" cy="32963"/>
+        </a:xfrm>
+        <a:custGeom>
+          <a:avLst/>
+          <a:gdLst/>
+          <a:ahLst/>
+          <a:cxnLst/>
+          <a:rect l="0" t="0" r="0" b="0"/>
+          <a:pathLst>
+            <a:path>
+              <a:moveTo>
+                <a:pt x="0" y="16481"/>
+              </a:moveTo>
+              <a:lnTo>
+                <a:pt x="782280" y="16481"/>
+              </a:lnTo>
+            </a:path>
+          </a:pathLst>
+        </a:custGeom>
+        <a:noFill/>
+        <a:ln w="12700" cap="flat" cmpd="sng" algn="ctr">
+          <a:solidFill>
+            <a:schemeClr val="dk2">
+              <a:shade val="60000"/>
+              <a:hueOff val="0"/>
+              <a:satOff val="0"/>
+              <a:lumOff val="0"/>
+              <a:alphaOff val="0"/>
+            </a:schemeClr>
+          </a:solidFill>
+          <a:prstDash val="solid"/>
+        </a:ln>
+        <a:effectLst/>
+      </dsp:spPr>
+      <dsp:style>
+        <a:lnRef idx="2">
+          <a:scrgbClr r="0" g="0" b="0"/>
+        </a:lnRef>
+        <a:fillRef idx="0">
+          <a:scrgbClr r="0" g="0" b="0"/>
+        </a:fillRef>
+        <a:effectRef idx="0">
+          <a:scrgbClr r="0" g="0" b="0"/>
+        </a:effectRef>
+        <a:fontRef idx="minor"/>
+      </dsp:style>
+      <dsp:txBody>
+        <a:bodyPr spcFirstLastPara="0" vert="horz" wrap="square" lIns="12700" tIns="0" rIns="12700" bIns="0" numCol="1" spcCol="1270" anchor="ctr" anchorCtr="0">
+          <a:noAutofit/>
+        </a:bodyPr>
+        <a:lstStyle/>
+        <a:p>
+          <a:pPr lvl="0" algn="ctr" defTabSz="800100">
+            <a:lnSpc>
+              <a:spcPct val="90000"/>
+            </a:lnSpc>
+            <a:spcBef>
+              <a:spcPct val="0"/>
+            </a:spcBef>
+            <a:spcAft>
+              <a:spcPct val="35000"/>
+            </a:spcAft>
+          </a:pPr>
+          <a:endParaRPr lang="fr-FR" sz="1800" b="1" kern="1200"/>
+        </a:p>
+      </dsp:txBody>
+      <dsp:txXfrm>
+        <a:off x="5159680" y="2396146"/>
+        <a:ext cx="39114" cy="39114"/>
+      </dsp:txXfrm>
+    </dsp:sp>
+    <dsp:sp modelId="{83B67E04-F1AD-47DB-B87E-9E759322BC47}">
+      <dsp:nvSpPr>
+        <dsp:cNvPr id="0" name=""/>
+        <dsp:cNvSpPr/>
+      </dsp:nvSpPr>
+      <dsp:spPr>
+        <a:xfrm>
+          <a:off x="5314721" y="904392"/>
+          <a:ext cx="1561376" cy="1561376"/>
+        </a:xfrm>
+        <a:prstGeom prst="ellipse">
+          <a:avLst/>
+        </a:prstGeom>
+        <a:solidFill>
+          <a:schemeClr val="lt1">
+            <a:hueOff val="0"/>
+            <a:satOff val="0"/>
+            <a:lumOff val="0"/>
+            <a:alphaOff val="0"/>
+          </a:schemeClr>
+        </a:solidFill>
+        <a:ln w="12700" cap="flat" cmpd="sng" algn="ctr">
+          <a:solidFill>
+            <a:schemeClr val="dk2">
+              <a:shade val="80000"/>
+              <a:hueOff val="0"/>
+              <a:satOff val="0"/>
+              <a:lumOff val="0"/>
+              <a:alphaOff val="0"/>
+            </a:schemeClr>
+          </a:solidFill>
+          <a:prstDash val="solid"/>
+        </a:ln>
+        <a:effectLst/>
+      </dsp:spPr>
+      <dsp:style>
+        <a:lnRef idx="2">
+          <a:scrgbClr r="0" g="0" b="0"/>
+        </a:lnRef>
+        <a:fillRef idx="1">
+          <a:scrgbClr r="0" g="0" b="0"/>
+        </a:fillRef>
+        <a:effectRef idx="0">
+          <a:scrgbClr r="0" g="0" b="0"/>
+        </a:effectRef>
+        <a:fontRef idx="minor">
+          <a:schemeClr val="lt1"/>
+        </a:fontRef>
+      </dsp:style>
+      <dsp:txBody>
+        <a:bodyPr spcFirstLastPara="0" vert="horz" wrap="square" lIns="11430" tIns="11430" rIns="11430" bIns="11430" numCol="1" spcCol="1270" anchor="ctr" anchorCtr="0">
+          <a:noAutofit/>
+        </a:bodyPr>
+        <a:lstStyle/>
+        <a:p>
+          <a:pPr lvl="0" algn="ctr" defTabSz="800100">
+            <a:lnSpc>
+              <a:spcPct val="90000"/>
+            </a:lnSpc>
+            <a:spcBef>
+              <a:spcPct val="0"/>
+            </a:spcBef>
+            <a:spcAft>
+              <a:spcPct val="35000"/>
+            </a:spcAft>
+          </a:pPr>
+          <a:r>
+            <a:rPr lang="fr-FR" sz="1800" b="1" kern="1200" dirty="0" smtClean="0"/>
+            <a:t>Montréal</a:t>
+          </a:r>
+          <a:br>
+            <a:rPr lang="fr-FR" sz="1800" b="1" kern="1200" dirty="0" smtClean="0"/>
+          </a:br>
+          <a:r>
+            <a:rPr lang="fr-FR" sz="1200" b="0" kern="1200" dirty="0" smtClean="0"/>
+            <a:t>5 300 000</a:t>
+          </a:r>
+          <a:endParaRPr lang="fr-FR" sz="1800" b="0" kern="1200" dirty="0"/>
+        </a:p>
+      </dsp:txBody>
+      <dsp:txXfrm>
+        <a:off x="5543379" y="1133050"/>
+        <a:ext cx="1104060" cy="1104060"/>
+      </dsp:txXfrm>
+    </dsp:sp>
+    <dsp:sp modelId="{B9454CC7-94F3-41E4-B96F-CDCB55B7AD10}">
+      <dsp:nvSpPr>
+        <dsp:cNvPr id="0" name=""/>
+        <dsp:cNvSpPr/>
+      </dsp:nvSpPr>
+      <dsp:spPr>
+        <a:xfrm rot="771429">
+          <a:off x="5014372" y="3390601"/>
+          <a:ext cx="782280" cy="32963"/>
+        </a:xfrm>
+        <a:custGeom>
+          <a:avLst/>
+          <a:gdLst/>
+          <a:ahLst/>
+          <a:cxnLst/>
+          <a:rect l="0" t="0" r="0" b="0"/>
+          <a:pathLst>
+            <a:path>
+              <a:moveTo>
+                <a:pt x="0" y="16481"/>
+              </a:moveTo>
+              <a:lnTo>
+                <a:pt x="782280" y="16481"/>
+              </a:lnTo>
+            </a:path>
+          </a:pathLst>
+        </a:custGeom>
+        <a:noFill/>
+        <a:ln w="12700" cap="flat" cmpd="sng" algn="ctr">
+          <a:solidFill>
+            <a:schemeClr val="dk2">
+              <a:shade val="60000"/>
+              <a:hueOff val="0"/>
+              <a:satOff val="0"/>
+              <a:lumOff val="0"/>
+              <a:alphaOff val="0"/>
+            </a:schemeClr>
+          </a:solidFill>
+          <a:prstDash val="solid"/>
+        </a:ln>
+        <a:effectLst/>
+      </dsp:spPr>
+      <dsp:style>
+        <a:lnRef idx="2">
+          <a:scrgbClr r="0" g="0" b="0"/>
+        </a:lnRef>
+        <a:fillRef idx="0">
+          <a:scrgbClr r="0" g="0" b="0"/>
+        </a:fillRef>
+        <a:effectRef idx="0">
+          <a:scrgbClr r="0" g="0" b="0"/>
+        </a:effectRef>
+        <a:fontRef idx="minor"/>
+      </dsp:style>
+      <dsp:txBody>
+        <a:bodyPr spcFirstLastPara="0" vert="horz" wrap="square" lIns="12700" tIns="0" rIns="12700" bIns="0" numCol="1" spcCol="1270" anchor="ctr" anchorCtr="0">
+          <a:noAutofit/>
+        </a:bodyPr>
+        <a:lstStyle/>
+        <a:p>
+          <a:pPr lvl="0" algn="ctr" defTabSz="800100">
+            <a:lnSpc>
+              <a:spcPct val="90000"/>
+            </a:lnSpc>
+            <a:spcBef>
+              <a:spcPct val="0"/>
+            </a:spcBef>
+            <a:spcAft>
+              <a:spcPct val="35000"/>
+            </a:spcAft>
+          </a:pPr>
+          <a:endParaRPr lang="fr-FR" sz="1800" b="1" kern="1200"/>
+        </a:p>
+      </dsp:txBody>
+      <dsp:txXfrm>
+        <a:off x="5385956" y="3387525"/>
+        <a:ext cx="39114" cy="39114"/>
+      </dsp:txXfrm>
+    </dsp:sp>
+    <dsp:sp modelId="{667F6A9D-FCFB-4D35-A93D-687A0B4681EB}">
+      <dsp:nvSpPr>
+        <dsp:cNvPr id="0" name=""/>
+        <dsp:cNvSpPr/>
+      </dsp:nvSpPr>
+      <dsp:spPr>
+        <a:xfrm>
+          <a:off x="5767273" y="2887151"/>
+          <a:ext cx="1561376" cy="1561376"/>
+        </a:xfrm>
+        <a:prstGeom prst="ellipse">
+          <a:avLst/>
+        </a:prstGeom>
+        <a:solidFill>
+          <a:schemeClr val="lt1">
+            <a:hueOff val="0"/>
+            <a:satOff val="0"/>
+            <a:lumOff val="0"/>
+            <a:alphaOff val="0"/>
+          </a:schemeClr>
+        </a:solidFill>
+        <a:ln w="12700" cap="flat" cmpd="sng" algn="ctr">
+          <a:solidFill>
+            <a:schemeClr val="dk2">
+              <a:shade val="80000"/>
+              <a:hueOff val="0"/>
+              <a:satOff val="0"/>
+              <a:lumOff val="0"/>
+              <a:alphaOff val="0"/>
+            </a:schemeClr>
+          </a:solidFill>
+          <a:prstDash val="solid"/>
+        </a:ln>
+        <a:effectLst/>
+      </dsp:spPr>
+      <dsp:style>
+        <a:lnRef idx="2">
+          <a:scrgbClr r="0" g="0" b="0"/>
+        </a:lnRef>
+        <a:fillRef idx="1">
+          <a:scrgbClr r="0" g="0" b="0"/>
+        </a:fillRef>
+        <a:effectRef idx="0">
+          <a:scrgbClr r="0" g="0" b="0"/>
+        </a:effectRef>
+        <a:fontRef idx="minor">
+          <a:schemeClr val="lt1"/>
+        </a:fontRef>
+      </dsp:style>
+      <dsp:txBody>
+        <a:bodyPr spcFirstLastPara="0" vert="horz" wrap="square" lIns="11430" tIns="11430" rIns="11430" bIns="11430" numCol="1" spcCol="1270" anchor="ctr" anchorCtr="0">
+          <a:noAutofit/>
+        </a:bodyPr>
+        <a:lstStyle/>
+        <a:p>
+          <a:pPr lvl="0" algn="ctr" defTabSz="800100">
+            <a:lnSpc>
+              <a:spcPct val="90000"/>
+            </a:lnSpc>
+            <a:spcBef>
+              <a:spcPct val="0"/>
+            </a:spcBef>
+            <a:spcAft>
+              <a:spcPct val="35000"/>
+            </a:spcAft>
+          </a:pPr>
+          <a:r>
+            <a:rPr lang="fr-FR" sz="1800" b="1" kern="1200" dirty="0" smtClean="0"/>
+            <a:t>Longueuil</a:t>
+          </a:r>
+          <a:br>
+            <a:rPr lang="fr-FR" sz="1800" b="1" kern="1200" dirty="0" smtClean="0"/>
+          </a:br>
+          <a:r>
+            <a:rPr lang="fr-FR" sz="1200" b="0" kern="1200" dirty="0" smtClean="0"/>
+            <a:t>400 000</a:t>
+          </a:r>
+          <a:endParaRPr lang="fr-FR" sz="1200" b="0" kern="1200" dirty="0"/>
+        </a:p>
+      </dsp:txBody>
+      <dsp:txXfrm>
+        <a:off x="5995931" y="3115809"/>
+        <a:ext cx="1104060" cy="1104060"/>
+      </dsp:txXfrm>
+    </dsp:sp>
+    <dsp:sp modelId="{FA4B00C5-E0B7-4731-9B4C-751B5D497453}">
+      <dsp:nvSpPr>
+        <dsp:cNvPr id="0" name=""/>
+        <dsp:cNvSpPr/>
+      </dsp:nvSpPr>
+      <dsp:spPr>
+        <a:xfrm rot="3857143">
+          <a:off x="4380361" y="4185625"/>
+          <a:ext cx="782280" cy="32963"/>
+        </a:xfrm>
+        <a:custGeom>
+          <a:avLst/>
+          <a:gdLst/>
+          <a:ahLst/>
+          <a:cxnLst/>
+          <a:rect l="0" t="0" r="0" b="0"/>
+          <a:pathLst>
+            <a:path>
+              <a:moveTo>
+                <a:pt x="0" y="16481"/>
+              </a:moveTo>
+              <a:lnTo>
+                <a:pt x="782280" y="16481"/>
+              </a:lnTo>
+            </a:path>
+          </a:pathLst>
+        </a:custGeom>
+        <a:noFill/>
+        <a:ln w="12700" cap="flat" cmpd="sng" algn="ctr">
+          <a:solidFill>
+            <a:schemeClr val="dk2">
+              <a:shade val="60000"/>
+              <a:hueOff val="0"/>
+              <a:satOff val="0"/>
+              <a:lumOff val="0"/>
+              <a:alphaOff val="0"/>
+            </a:schemeClr>
+          </a:solidFill>
+          <a:prstDash val="solid"/>
+        </a:ln>
+        <a:effectLst/>
+      </dsp:spPr>
+      <dsp:style>
+        <a:lnRef idx="2">
+          <a:scrgbClr r="0" g="0" b="0"/>
+        </a:lnRef>
+        <a:fillRef idx="0">
+          <a:scrgbClr r="0" g="0" b="0"/>
+        </a:fillRef>
+        <a:effectRef idx="0">
+          <a:scrgbClr r="0" g="0" b="0"/>
+        </a:effectRef>
+        <a:fontRef idx="minor"/>
+      </dsp:style>
+      <dsp:txBody>
+        <a:bodyPr spcFirstLastPara="0" vert="horz" wrap="square" lIns="12700" tIns="0" rIns="12700" bIns="0" numCol="1" spcCol="1270" anchor="ctr" anchorCtr="0">
+          <a:noAutofit/>
+        </a:bodyPr>
+        <a:lstStyle/>
+        <a:p>
+          <a:pPr lvl="0" algn="ctr" defTabSz="800100">
+            <a:lnSpc>
+              <a:spcPct val="90000"/>
+            </a:lnSpc>
+            <a:spcBef>
+              <a:spcPct val="0"/>
+            </a:spcBef>
+            <a:spcAft>
+              <a:spcPct val="35000"/>
+            </a:spcAft>
+          </a:pPr>
+          <a:endParaRPr lang="fr-FR" sz="1800" b="1" kern="1200"/>
+        </a:p>
+      </dsp:txBody>
+      <dsp:txXfrm>
+        <a:off x="4751945" y="4182550"/>
+        <a:ext cx="39114" cy="39114"/>
+      </dsp:txXfrm>
+    </dsp:sp>
+    <dsp:sp modelId="{3522F295-5D61-402E-8F3A-78D4DCC466D2}">
+      <dsp:nvSpPr>
+        <dsp:cNvPr id="0" name=""/>
+        <dsp:cNvSpPr/>
+      </dsp:nvSpPr>
+      <dsp:spPr>
+        <a:xfrm>
+          <a:off x="4499251" y="4477200"/>
+          <a:ext cx="1561376" cy="1561376"/>
+        </a:xfrm>
+        <a:prstGeom prst="ellipse">
+          <a:avLst/>
+        </a:prstGeom>
+        <a:solidFill>
+          <a:schemeClr val="lt1">
+            <a:hueOff val="0"/>
+            <a:satOff val="0"/>
+            <a:lumOff val="0"/>
+            <a:alphaOff val="0"/>
+          </a:schemeClr>
+        </a:solidFill>
+        <a:ln w="12700" cap="flat" cmpd="sng" algn="ctr">
+          <a:solidFill>
+            <a:schemeClr val="dk2">
+              <a:shade val="80000"/>
+              <a:hueOff val="0"/>
+              <a:satOff val="0"/>
+              <a:lumOff val="0"/>
+              <a:alphaOff val="0"/>
+            </a:schemeClr>
+          </a:solidFill>
+          <a:prstDash val="solid"/>
+        </a:ln>
+        <a:effectLst/>
+      </dsp:spPr>
+      <dsp:style>
+        <a:lnRef idx="2">
+          <a:scrgbClr r="0" g="0" b="0"/>
+        </a:lnRef>
+        <a:fillRef idx="1">
+          <a:scrgbClr r="0" g="0" b="0"/>
+        </a:fillRef>
+        <a:effectRef idx="0">
+          <a:scrgbClr r="0" g="0" b="0"/>
+        </a:effectRef>
+        <a:fontRef idx="minor">
+          <a:schemeClr val="lt1"/>
+        </a:fontRef>
+      </dsp:style>
+      <dsp:txBody>
+        <a:bodyPr spcFirstLastPara="0" vert="horz" wrap="square" lIns="11430" tIns="11430" rIns="11430" bIns="11430" numCol="1" spcCol="1270" anchor="ctr" anchorCtr="0">
+          <a:noAutofit/>
+        </a:bodyPr>
+        <a:lstStyle/>
+        <a:p>
+          <a:pPr lvl="0" algn="ctr" defTabSz="800100">
+            <a:lnSpc>
+              <a:spcPct val="90000"/>
+            </a:lnSpc>
+            <a:spcBef>
+              <a:spcPct val="0"/>
+            </a:spcBef>
+            <a:spcAft>
+              <a:spcPct val="35000"/>
+            </a:spcAft>
+          </a:pPr>
+          <a:r>
+            <a:rPr lang="fr-FR" sz="1800" b="1" kern="1200" dirty="0" smtClean="0"/>
+            <a:t>Laval</a:t>
+          </a:r>
+          <a:br>
+            <a:rPr lang="fr-FR" sz="1800" b="1" kern="1200" dirty="0" smtClean="0"/>
+          </a:br>
+          <a:r>
+            <a:rPr lang="fr-FR" sz="1200" b="0" kern="1200" dirty="0" smtClean="0"/>
+            <a:t>660 000</a:t>
+          </a:r>
+          <a:endParaRPr lang="fr-FR" sz="1200" b="0" kern="1200" dirty="0"/>
+        </a:p>
+      </dsp:txBody>
+      <dsp:txXfrm>
+        <a:off x="4727909" y="4705858"/>
+        <a:ext cx="1104060" cy="1104060"/>
+      </dsp:txXfrm>
+    </dsp:sp>
+    <dsp:sp modelId="{C2CB4669-CFDC-402E-A64D-16031B3AA48B}">
+      <dsp:nvSpPr>
+        <dsp:cNvPr id="0" name=""/>
+        <dsp:cNvSpPr/>
+      </dsp:nvSpPr>
+      <dsp:spPr>
+        <a:xfrm rot="6942857">
+          <a:off x="3363487" y="4185625"/>
+          <a:ext cx="782280" cy="32963"/>
+        </a:xfrm>
+        <a:custGeom>
+          <a:avLst/>
+          <a:gdLst/>
+          <a:ahLst/>
+          <a:cxnLst/>
+          <a:rect l="0" t="0" r="0" b="0"/>
+          <a:pathLst>
+            <a:path>
+              <a:moveTo>
+                <a:pt x="0" y="16481"/>
+              </a:moveTo>
+              <a:lnTo>
+                <a:pt x="782280" y="16481"/>
+              </a:lnTo>
+            </a:path>
+          </a:pathLst>
+        </a:custGeom>
+        <a:noFill/>
+        <a:ln w="12700" cap="flat" cmpd="sng" algn="ctr">
+          <a:solidFill>
+            <a:schemeClr val="dk2">
+              <a:shade val="60000"/>
+              <a:hueOff val="0"/>
+              <a:satOff val="0"/>
+              <a:lumOff val="0"/>
+              <a:alphaOff val="0"/>
+            </a:schemeClr>
+          </a:solidFill>
+          <a:prstDash val="solid"/>
+        </a:ln>
+        <a:effectLst/>
+      </dsp:spPr>
+      <dsp:style>
+        <a:lnRef idx="2">
+          <a:scrgbClr r="0" g="0" b="0"/>
+        </a:lnRef>
+        <a:fillRef idx="0">
+          <a:scrgbClr r="0" g="0" b="0"/>
+        </a:fillRef>
+        <a:effectRef idx="0">
+          <a:scrgbClr r="0" g="0" b="0"/>
+        </a:effectRef>
+        <a:fontRef idx="minor"/>
+      </dsp:style>
+      <dsp:txBody>
+        <a:bodyPr spcFirstLastPara="0" vert="horz" wrap="square" lIns="12700" tIns="0" rIns="12700" bIns="0" numCol="1" spcCol="1270" anchor="ctr" anchorCtr="0">
+          <a:noAutofit/>
+        </a:bodyPr>
+        <a:lstStyle/>
+        <a:p>
+          <a:pPr lvl="0" algn="ctr" defTabSz="800100">
+            <a:lnSpc>
+              <a:spcPct val="90000"/>
+            </a:lnSpc>
+            <a:spcBef>
+              <a:spcPct val="0"/>
+            </a:spcBef>
+            <a:spcAft>
+              <a:spcPct val="35000"/>
+            </a:spcAft>
+          </a:pPr>
+          <a:endParaRPr lang="fr-FR" sz="1800" b="1" kern="1200"/>
+        </a:p>
+      </dsp:txBody>
+      <dsp:txXfrm rot="10800000">
+        <a:off x="3735070" y="4182550"/>
+        <a:ext cx="39114" cy="39114"/>
+      </dsp:txXfrm>
+    </dsp:sp>
+    <dsp:sp modelId="{A30451DB-269B-4955-9D01-6A5BA636F583}">
+      <dsp:nvSpPr>
+        <dsp:cNvPr id="0" name=""/>
+        <dsp:cNvSpPr/>
+      </dsp:nvSpPr>
+      <dsp:spPr>
+        <a:xfrm>
+          <a:off x="2465502" y="4477200"/>
+          <a:ext cx="1561376" cy="1561376"/>
+        </a:xfrm>
+        <a:prstGeom prst="ellipse">
+          <a:avLst/>
+        </a:prstGeom>
+        <a:solidFill>
+          <a:schemeClr val="lt1">
+            <a:hueOff val="0"/>
+            <a:satOff val="0"/>
+            <a:lumOff val="0"/>
+            <a:alphaOff val="0"/>
+          </a:schemeClr>
+        </a:solidFill>
+        <a:ln w="12700" cap="flat" cmpd="sng" algn="ctr">
+          <a:solidFill>
+            <a:schemeClr val="dk2">
+              <a:shade val="80000"/>
+              <a:hueOff val="0"/>
+              <a:satOff val="0"/>
+              <a:lumOff val="0"/>
+              <a:alphaOff val="0"/>
+            </a:schemeClr>
+          </a:solidFill>
+          <a:prstDash val="solid"/>
+        </a:ln>
+        <a:effectLst/>
+      </dsp:spPr>
+      <dsp:style>
+        <a:lnRef idx="2">
+          <a:scrgbClr r="0" g="0" b="0"/>
+        </a:lnRef>
+        <a:fillRef idx="1">
+          <a:scrgbClr r="0" g="0" b="0"/>
+        </a:fillRef>
+        <a:effectRef idx="0">
+          <a:scrgbClr r="0" g="0" b="0"/>
+        </a:effectRef>
+        <a:fontRef idx="minor">
+          <a:schemeClr val="lt1"/>
+        </a:fontRef>
+      </dsp:style>
+      <dsp:txBody>
+        <a:bodyPr spcFirstLastPara="0" vert="horz" wrap="square" lIns="11430" tIns="11430" rIns="11430" bIns="11430" numCol="1" spcCol="1270" anchor="ctr" anchorCtr="0">
+          <a:noAutofit/>
+        </a:bodyPr>
+        <a:lstStyle/>
+        <a:p>
+          <a:pPr lvl="0" algn="ctr" defTabSz="800100">
+            <a:lnSpc>
+              <a:spcPct val="90000"/>
+            </a:lnSpc>
+            <a:spcBef>
+              <a:spcPct val="0"/>
+            </a:spcBef>
+            <a:spcAft>
+              <a:spcPct val="35000"/>
+            </a:spcAft>
+          </a:pPr>
+          <a:r>
+            <a:rPr lang="fr-FR" sz="1800" b="1" kern="1200" dirty="0" smtClean="0"/>
+            <a:t>Gatineau</a:t>
+          </a:r>
+          <a:br>
+            <a:rPr lang="fr-FR" sz="1800" b="1" kern="1200" dirty="0" smtClean="0"/>
+          </a:br>
+          <a:r>
+            <a:rPr lang="fr-FR" sz="1200" b="0" kern="1200" dirty="0" smtClean="0"/>
+            <a:t>630 000</a:t>
+          </a:r>
+          <a:endParaRPr lang="fr-FR" sz="1200" b="0" kern="1200" dirty="0"/>
+        </a:p>
+      </dsp:txBody>
+      <dsp:txXfrm>
+        <a:off x="2694160" y="4705858"/>
+        <a:ext cx="1104060" cy="1104060"/>
+      </dsp:txXfrm>
+    </dsp:sp>
+    <dsp:sp modelId="{99A0870C-693F-48DD-929B-DEC3D8247AF6}">
+      <dsp:nvSpPr>
+        <dsp:cNvPr id="0" name=""/>
+        <dsp:cNvSpPr/>
+      </dsp:nvSpPr>
+      <dsp:spPr>
+        <a:xfrm rot="10028571">
+          <a:off x="2729476" y="3390601"/>
+          <a:ext cx="782280" cy="32963"/>
+        </a:xfrm>
+        <a:custGeom>
+          <a:avLst/>
+          <a:gdLst/>
+          <a:ahLst/>
+          <a:cxnLst/>
+          <a:rect l="0" t="0" r="0" b="0"/>
+          <a:pathLst>
+            <a:path>
+              <a:moveTo>
+                <a:pt x="0" y="16481"/>
+              </a:moveTo>
+              <a:lnTo>
+                <a:pt x="782280" y="16481"/>
+              </a:lnTo>
+            </a:path>
+          </a:pathLst>
+        </a:custGeom>
+        <a:noFill/>
+        <a:ln w="12700" cap="flat" cmpd="sng" algn="ctr">
+          <a:solidFill>
+            <a:schemeClr val="dk2">
+              <a:shade val="60000"/>
+              <a:hueOff val="0"/>
+              <a:satOff val="0"/>
+              <a:lumOff val="0"/>
+              <a:alphaOff val="0"/>
+            </a:schemeClr>
+          </a:solidFill>
+          <a:prstDash val="solid"/>
+        </a:ln>
+        <a:effectLst/>
+      </dsp:spPr>
+      <dsp:style>
+        <a:lnRef idx="2">
+          <a:scrgbClr r="0" g="0" b="0"/>
+        </a:lnRef>
+        <a:fillRef idx="0">
+          <a:scrgbClr r="0" g="0" b="0"/>
+        </a:fillRef>
+        <a:effectRef idx="0">
+          <a:scrgbClr r="0" g="0" b="0"/>
+        </a:effectRef>
+        <a:fontRef idx="minor"/>
+      </dsp:style>
+      <dsp:txBody>
+        <a:bodyPr spcFirstLastPara="0" vert="horz" wrap="square" lIns="12700" tIns="0" rIns="12700" bIns="0" numCol="1" spcCol="1270" anchor="ctr" anchorCtr="0">
+          <a:noAutofit/>
+        </a:bodyPr>
+        <a:lstStyle/>
+        <a:p>
+          <a:pPr lvl="0" algn="ctr" defTabSz="800100">
+            <a:lnSpc>
+              <a:spcPct val="90000"/>
+            </a:lnSpc>
+            <a:spcBef>
+              <a:spcPct val="0"/>
+            </a:spcBef>
+            <a:spcAft>
+              <a:spcPct val="35000"/>
+            </a:spcAft>
+          </a:pPr>
+          <a:endParaRPr lang="fr-FR" sz="1800" b="1" kern="1200"/>
+        </a:p>
+      </dsp:txBody>
+      <dsp:txXfrm rot="10800000">
+        <a:off x="3101059" y="3387525"/>
+        <a:ext cx="39114" cy="39114"/>
+      </dsp:txXfrm>
+    </dsp:sp>
+    <dsp:sp modelId="{A40A2930-7EBD-4FC2-89A8-5EEF466B076E}">
+      <dsp:nvSpPr>
+        <dsp:cNvPr id="0" name=""/>
+        <dsp:cNvSpPr/>
+      </dsp:nvSpPr>
+      <dsp:spPr>
+        <a:xfrm>
+          <a:off x="1197480" y="2887151"/>
+          <a:ext cx="1561376" cy="1561376"/>
+        </a:xfrm>
+        <a:prstGeom prst="ellipse">
+          <a:avLst/>
+        </a:prstGeom>
+        <a:solidFill>
+          <a:schemeClr val="lt1">
+            <a:hueOff val="0"/>
+            <a:satOff val="0"/>
+            <a:lumOff val="0"/>
+            <a:alphaOff val="0"/>
+          </a:schemeClr>
+        </a:solidFill>
+        <a:ln w="12700" cap="flat" cmpd="sng" algn="ctr">
+          <a:solidFill>
+            <a:schemeClr val="dk2">
+              <a:shade val="80000"/>
+              <a:hueOff val="0"/>
+              <a:satOff val="0"/>
+              <a:lumOff val="0"/>
+              <a:alphaOff val="0"/>
+            </a:schemeClr>
+          </a:solidFill>
+          <a:prstDash val="solid"/>
+        </a:ln>
+        <a:effectLst/>
+      </dsp:spPr>
+      <dsp:style>
+        <a:lnRef idx="2">
+          <a:scrgbClr r="0" g="0" b="0"/>
+        </a:lnRef>
+        <a:fillRef idx="1">
+          <a:scrgbClr r="0" g="0" b="0"/>
+        </a:fillRef>
+        <a:effectRef idx="0">
+          <a:scrgbClr r="0" g="0" b="0"/>
+        </a:effectRef>
+        <a:fontRef idx="minor">
+          <a:schemeClr val="lt1"/>
+        </a:fontRef>
+      </dsp:style>
+      <dsp:txBody>
+        <a:bodyPr spcFirstLastPara="0" vert="horz" wrap="square" lIns="11430" tIns="11430" rIns="11430" bIns="11430" numCol="1" spcCol="1270" anchor="ctr" anchorCtr="0">
+          <a:noAutofit/>
+        </a:bodyPr>
+        <a:lstStyle/>
+        <a:p>
+          <a:pPr lvl="0" algn="ctr" defTabSz="800100">
+            <a:lnSpc>
+              <a:spcPct val="90000"/>
+            </a:lnSpc>
+            <a:spcBef>
+              <a:spcPct val="0"/>
+            </a:spcBef>
+            <a:spcAft>
+              <a:spcPct val="35000"/>
+            </a:spcAft>
+          </a:pPr>
+          <a:r>
+            <a:rPr lang="fr-FR" sz="1800" b="1" kern="1200" dirty="0" smtClean="0"/>
+            <a:t>Québec</a:t>
+          </a:r>
+          <a:br>
+            <a:rPr lang="fr-FR" sz="1800" b="1" kern="1200" dirty="0" smtClean="0"/>
+          </a:br>
+          <a:r>
+            <a:rPr lang="fr-FR" sz="1200" b="0" kern="1200" dirty="0" smtClean="0"/>
+            <a:t>870 000</a:t>
+          </a:r>
+          <a:endParaRPr lang="fr-FR" sz="1200" b="0" kern="1200" dirty="0"/>
+        </a:p>
+      </dsp:txBody>
+      <dsp:txXfrm>
+        <a:off x="1426138" y="3115809"/>
+        <a:ext cx="1104060" cy="1104060"/>
+      </dsp:txXfrm>
+    </dsp:sp>
+    <dsp:sp modelId="{0D1274E7-D39B-4955-A8D8-AA7748242242}">
+      <dsp:nvSpPr>
+        <dsp:cNvPr id="0" name=""/>
+        <dsp:cNvSpPr/>
+      </dsp:nvSpPr>
+      <dsp:spPr>
+        <a:xfrm rot="13114286">
+          <a:off x="2955752" y="2399221"/>
+          <a:ext cx="782280" cy="32963"/>
+        </a:xfrm>
+        <a:custGeom>
+          <a:avLst/>
+          <a:gdLst/>
+          <a:ahLst/>
+          <a:cxnLst/>
+          <a:rect l="0" t="0" r="0" b="0"/>
+          <a:pathLst>
+            <a:path>
+              <a:moveTo>
+                <a:pt x="0" y="16481"/>
+              </a:moveTo>
+              <a:lnTo>
+                <a:pt x="782280" y="16481"/>
+              </a:lnTo>
+            </a:path>
+          </a:pathLst>
+        </a:custGeom>
+        <a:noFill/>
+        <a:ln w="12700" cap="flat" cmpd="sng" algn="ctr">
+          <a:solidFill>
+            <a:schemeClr val="dk2">
+              <a:shade val="60000"/>
+              <a:hueOff val="0"/>
+              <a:satOff val="0"/>
+              <a:lumOff val="0"/>
+              <a:alphaOff val="0"/>
+            </a:schemeClr>
+          </a:solidFill>
+          <a:prstDash val="solid"/>
+        </a:ln>
+        <a:effectLst/>
+      </dsp:spPr>
+      <dsp:style>
+        <a:lnRef idx="2">
+          <a:scrgbClr r="0" g="0" b="0"/>
+        </a:lnRef>
+        <a:fillRef idx="0">
+          <a:scrgbClr r="0" g="0" b="0"/>
+        </a:fillRef>
+        <a:effectRef idx="0">
+          <a:scrgbClr r="0" g="0" b="0"/>
+        </a:effectRef>
+        <a:fontRef idx="minor"/>
+      </dsp:style>
+      <dsp:txBody>
+        <a:bodyPr spcFirstLastPara="0" vert="horz" wrap="square" lIns="12700" tIns="0" rIns="12700" bIns="0" numCol="1" spcCol="1270" anchor="ctr" anchorCtr="0">
+          <a:noAutofit/>
+        </a:bodyPr>
+        <a:lstStyle/>
+        <a:p>
+          <a:pPr lvl="0" algn="ctr" defTabSz="800100">
+            <a:lnSpc>
+              <a:spcPct val="90000"/>
+            </a:lnSpc>
+            <a:spcBef>
+              <a:spcPct val="0"/>
+            </a:spcBef>
+            <a:spcAft>
+              <a:spcPct val="35000"/>
+            </a:spcAft>
+          </a:pPr>
+          <a:endParaRPr lang="fr-FR" sz="1800" b="1" kern="1200"/>
+        </a:p>
+      </dsp:txBody>
+      <dsp:txXfrm rot="10800000">
+        <a:off x="3327335" y="2396146"/>
+        <a:ext cx="39114" cy="39114"/>
+      </dsp:txXfrm>
+    </dsp:sp>
+    <dsp:sp modelId="{AF6F782E-A7DA-4E42-8266-553F03DE66F2}">
+      <dsp:nvSpPr>
+        <dsp:cNvPr id="0" name=""/>
+        <dsp:cNvSpPr/>
+      </dsp:nvSpPr>
+      <dsp:spPr>
+        <a:xfrm>
+          <a:off x="1650032" y="904392"/>
+          <a:ext cx="1561376" cy="1561376"/>
+        </a:xfrm>
+        <a:prstGeom prst="ellipse">
+          <a:avLst/>
+        </a:prstGeom>
+        <a:solidFill>
+          <a:schemeClr val="lt1">
+            <a:hueOff val="0"/>
+            <a:satOff val="0"/>
+            <a:lumOff val="0"/>
+            <a:alphaOff val="0"/>
+          </a:schemeClr>
+        </a:solidFill>
+        <a:ln w="12700" cap="flat" cmpd="sng" algn="ctr">
+          <a:solidFill>
+            <a:schemeClr val="dk2">
+              <a:shade val="80000"/>
+              <a:hueOff val="0"/>
+              <a:satOff val="0"/>
+              <a:lumOff val="0"/>
+              <a:alphaOff val="0"/>
+            </a:schemeClr>
+          </a:solidFill>
+          <a:prstDash val="solid"/>
+        </a:ln>
+        <a:effectLst/>
+      </dsp:spPr>
+      <dsp:style>
+        <a:lnRef idx="2">
+          <a:scrgbClr r="0" g="0" b="0"/>
+        </a:lnRef>
+        <a:fillRef idx="1">
+          <a:scrgbClr r="0" g="0" b="0"/>
+        </a:fillRef>
+        <a:effectRef idx="0">
+          <a:scrgbClr r="0" g="0" b="0"/>
+        </a:effectRef>
+        <a:fontRef idx="minor">
+          <a:schemeClr val="lt1"/>
+        </a:fontRef>
+      </dsp:style>
+      <dsp:txBody>
+        <a:bodyPr spcFirstLastPara="0" vert="horz" wrap="square" lIns="11430" tIns="11430" rIns="11430" bIns="11430" numCol="1" spcCol="1270" anchor="ctr" anchorCtr="0">
+          <a:noAutofit/>
+        </a:bodyPr>
+        <a:lstStyle/>
+        <a:p>
+          <a:pPr lvl="0" algn="ctr" defTabSz="800100">
+            <a:lnSpc>
+              <a:spcPct val="90000"/>
+            </a:lnSpc>
+            <a:spcBef>
+              <a:spcPct val="0"/>
+            </a:spcBef>
+            <a:spcAft>
+              <a:spcPct val="35000"/>
+            </a:spcAft>
+          </a:pPr>
+          <a:r>
+            <a:rPr lang="fr-FR" sz="1800" b="1" kern="1200" dirty="0" smtClean="0"/>
+            <a:t>Autre</a:t>
+          </a:r>
+          <a:br>
+            <a:rPr lang="fr-FR" sz="1800" b="1" kern="1200" dirty="0" smtClean="0"/>
+          </a:br>
+          <a:r>
+            <a:rPr lang="fr-FR" sz="1200" b="0" kern="1200" dirty="0" smtClean="0"/>
+            <a:t>AMT</a:t>
+          </a:r>
+          <a:br>
+            <a:rPr lang="fr-FR" sz="1200" b="0" kern="1200" dirty="0" smtClean="0"/>
+          </a:br>
+          <a:r>
+            <a:rPr lang="fr-FR" sz="1200" b="0" kern="1200" dirty="0" smtClean="0"/>
+            <a:t>CIT</a:t>
+          </a:r>
+          <a:br>
+            <a:rPr lang="fr-FR" sz="1200" b="0" kern="1200" dirty="0" smtClean="0"/>
+          </a:br>
+          <a:r>
+            <a:rPr lang="fr-FR" sz="1200" b="0" kern="1200" dirty="0" smtClean="0"/>
+            <a:t>…</a:t>
+          </a:r>
+          <a:endParaRPr lang="fr-FR" sz="1200" b="0" kern="1200" dirty="0"/>
+        </a:p>
+      </dsp:txBody>
+      <dsp:txXfrm>
+        <a:off x="1878690" y="1133050"/>
+        <a:ext cx="1104060" cy="1104060"/>
+      </dsp:txXfrm>
+    </dsp:sp>
   </dsp:spTree>
 </dsp:drawing>
 </file>
@@ -3027,7 +4256,7 @@
           <a:p>
             <a:fld id="{17C752C0-EE7C-4EB1-A738-93F71A28E296}" type="datetimeFigureOut">
               <a:rPr lang="fr-FR" smtClean="0"/>
-              <a:t>12/03/2017</a:t>
+              <a:t>13/03/2017</a:t>
             </a:fld>
             <a:endParaRPr lang="fr-FR"/>
           </a:p>
@@ -3456,7 +4685,10 @@
               <a:buFont typeface="Arial" panose="020B0604020202020204" pitchFamily="34" charset="0"/>
               <a:buNone/>
             </a:pPr>
-            <a:endParaRPr lang="fr-FR" dirty="0" smtClean="0"/>
+            <a:r>
+              <a:rPr lang="fr-FR" dirty="0" smtClean="0"/>
+              <a:t>Carte isochrone</a:t>
+            </a:r>
           </a:p>
         </p:txBody>
       </p:sp>
@@ -3486,7 +4718,7 @@
     </p:spTree>
     <p:extLst>
       <p:ext uri="{BB962C8B-B14F-4D97-AF65-F5344CB8AC3E}">
-        <p14:creationId xmlns:p14="http://schemas.microsoft.com/office/powerpoint/2010/main" val="3916277684"/>
+        <p14:creationId xmlns:p14="http://schemas.microsoft.com/office/powerpoint/2010/main" val="1045981531"/>
       </p:ext>
     </p:extLst>
   </p:cSld>
@@ -3544,10 +4776,7 @@
               <a:buFont typeface="Arial" panose="020B0604020202020204" pitchFamily="34" charset="0"/>
               <a:buNone/>
             </a:pPr>
-            <a:r>
-              <a:rPr lang="fr-FR" dirty="0" smtClean="0"/>
-              <a:t>Carte isochrone</a:t>
-            </a:r>
+            <a:endParaRPr lang="fr-FR" dirty="0" smtClean="0"/>
           </a:p>
         </p:txBody>
       </p:sp>
@@ -3577,7 +4806,7 @@
     </p:spTree>
     <p:extLst>
       <p:ext uri="{BB962C8B-B14F-4D97-AF65-F5344CB8AC3E}">
-        <p14:creationId xmlns:p14="http://schemas.microsoft.com/office/powerpoint/2010/main" val="1045981531"/>
+        <p14:creationId xmlns:p14="http://schemas.microsoft.com/office/powerpoint/2010/main" val="3916277684"/>
       </p:ext>
     </p:extLst>
   </p:cSld>
@@ -4274,7 +5503,7 @@
             <a:fld id="{68A33462-E29B-4D13-822E-B8BEDFA416A5}" type="datetime1">
               <a:rPr lang="sv-SE" smtClean="0"/>
               <a:pPr/>
-              <a:t>2017-03-12</a:t>
+              <a:t>2017-03-13</a:t>
             </a:fld>
             <a:endParaRPr lang="sv-SE"/>
           </a:p>
@@ -4472,7 +5701,7 @@
                 </a:solidFill>
               </a:rPr>
               <a:pPr/>
-              <a:t>2017-03-12</a:t>
+              <a:t>2017-03-13</a:t>
             </a:fld>
             <a:endParaRPr lang="sv-SE">
               <a:solidFill>
@@ -4684,7 +5913,7 @@
                 </a:solidFill>
               </a:rPr>
               <a:pPr/>
-              <a:t>2017-03-12</a:t>
+              <a:t>2017-03-13</a:t>
             </a:fld>
             <a:endParaRPr lang="sv-SE">
               <a:solidFill>
@@ -4886,7 +6115,7 @@
                 </a:solidFill>
               </a:rPr>
               <a:pPr/>
-              <a:t>2017-03-12</a:t>
+              <a:t>2017-03-13</a:t>
             </a:fld>
             <a:endParaRPr lang="sv-SE">
               <a:solidFill>
@@ -5174,7 +6403,7 @@
                 </a:solidFill>
               </a:rPr>
               <a:pPr/>
-              <a:t>2017-03-12</a:t>
+              <a:t>2017-03-13</a:t>
             </a:fld>
             <a:endParaRPr lang="sv-SE">
               <a:solidFill>
@@ -5494,7 +6723,7 @@
                 </a:solidFill>
               </a:rPr>
               <a:pPr/>
-              <a:t>2017-03-12</a:t>
+              <a:t>2017-03-13</a:t>
             </a:fld>
             <a:endParaRPr lang="sv-SE">
               <a:solidFill>
@@ -5964,7 +7193,7 @@
                 </a:solidFill>
               </a:rPr>
               <a:pPr/>
-              <a:t>2017-03-12</a:t>
+              <a:t>2017-03-13</a:t>
             </a:fld>
             <a:endParaRPr lang="sv-SE">
               <a:solidFill>
@@ -6114,7 +7343,7 @@
                 </a:solidFill>
               </a:rPr>
               <a:pPr/>
-              <a:t>2017-03-12</a:t>
+              <a:t>2017-03-13</a:t>
             </a:fld>
             <a:endParaRPr lang="sv-SE">
               <a:solidFill>
@@ -6241,7 +7470,7 @@
                 </a:solidFill>
               </a:rPr>
               <a:pPr/>
-              <a:t>2017-03-12</a:t>
+              <a:t>2017-03-13</a:t>
             </a:fld>
             <a:endParaRPr lang="sv-SE">
               <a:solidFill>
@@ -6629,7 +7858,7 @@
                 </a:solidFill>
               </a:rPr>
               <a:pPr/>
-              <a:t>2017-03-12</a:t>
+              <a:t>2017-03-13</a:t>
             </a:fld>
             <a:endParaRPr lang="sv-SE">
               <a:solidFill>
@@ -6959,7 +8188,7 @@
             <a:fld id="{6284FA38-B95C-4768-9847-A383481F2D81}" type="datetime1">
               <a:rPr lang="sv-SE" smtClean="0"/>
               <a:pPr/>
-              <a:t>2017-03-12</a:t>
+              <a:t>2017-03-13</a:t>
             </a:fld>
             <a:endParaRPr lang="sv-SE"/>
           </a:p>
@@ -7200,7 +8429,7 @@
                 </a:solidFill>
               </a:rPr>
               <a:pPr/>
-              <a:t>2017-03-12</a:t>
+              <a:t>2017-03-13</a:t>
             </a:fld>
             <a:endParaRPr lang="sv-SE">
               <a:solidFill>
@@ -7846,6 +9075,99 @@
       </p:grpSpPr>
       <p:sp>
         <p:nvSpPr>
+          <p:cNvPr id="2" name="Titre 1"/>
+          <p:cNvSpPr>
+            <a:spLocks noGrp="1"/>
+          </p:cNvSpPr>
+          <p:nvPr>
+            <p:ph type="title"/>
+          </p:nvPr>
+        </p:nvSpPr>
+        <p:spPr>
+          <a:xfrm>
+            <a:off x="657224" y="-204"/>
+            <a:ext cx="10772775" cy="1658198"/>
+          </a:xfrm>
+        </p:spPr>
+        <p:txBody>
+          <a:bodyPr/>
+          <a:lstStyle/>
+          <a:p>
+            <a:r>
+              <a:rPr lang="fr-FR" dirty="0" smtClean="0"/>
+              <a:t>Existant</a:t>
+            </a:r>
+            <a:endParaRPr lang="fr-FR" dirty="0">
+              <a:solidFill>
+                <a:schemeClr val="tx1">
+                  <a:lumMod val="50000"/>
+                  <a:lumOff val="50000"/>
+                </a:schemeClr>
+              </a:solidFill>
+            </a:endParaRPr>
+          </a:p>
+        </p:txBody>
+      </p:sp>
+      <p:pic>
+        <p:nvPicPr>
+          <p:cNvPr id="7" name="Espace réservé du contenu 6"/>
+          <p:cNvPicPr>
+            <a:picLocks noGrp="1" noChangeAspect="1"/>
+          </p:cNvPicPr>
+          <p:nvPr>
+            <p:ph sz="half" idx="2"/>
+          </p:nvPr>
+        </p:nvPicPr>
+        <p:blipFill>
+          <a:blip r:embed="rId3">
+            <a:extLst>
+              <a:ext uri="{28A0092B-C50C-407E-A947-70E740481C1C}">
+                <a14:useLocalDpi xmlns:a14="http://schemas.microsoft.com/office/drawing/2010/main" val="0"/>
+              </a:ext>
+            </a:extLst>
+          </a:blip>
+          <a:stretch>
+            <a:fillRect/>
+          </a:stretch>
+        </p:blipFill>
+        <p:spPr>
+          <a:xfrm>
+            <a:off x="722311" y="2319663"/>
+            <a:ext cx="4891679" cy="3281501"/>
+          </a:xfrm>
+        </p:spPr>
+      </p:pic>
+      <p:pic>
+        <p:nvPicPr>
+          <p:cNvPr id="12" name="Espace réservé du contenu 11"/>
+          <p:cNvPicPr>
+            <a:picLocks noGrp="1" noChangeAspect="1"/>
+          </p:cNvPicPr>
+          <p:nvPr>
+            <p:ph sz="quarter" idx="4"/>
+          </p:nvPr>
+        </p:nvPicPr>
+        <p:blipFill>
+          <a:blip r:embed="rId4">
+            <a:extLst>
+              <a:ext uri="{28A0092B-C50C-407E-A947-70E740481C1C}">
+                <a14:useLocalDpi xmlns:a14="http://schemas.microsoft.com/office/drawing/2010/main" val="0"/>
+              </a:ext>
+            </a:extLst>
+          </a:blip>
+          <a:stretch>
+            <a:fillRect/>
+          </a:stretch>
+        </p:blipFill>
+        <p:spPr>
+          <a:xfrm>
+            <a:off x="6007100" y="2319663"/>
+            <a:ext cx="5871472" cy="3281500"/>
+          </a:xfrm>
+        </p:spPr>
+      </p:pic>
+      <p:sp>
+        <p:nvSpPr>
           <p:cNvPr id="4" name="Espace réservé du numéro de diapositive 3"/>
           <p:cNvSpPr>
             <a:spLocks noGrp="1"/>
@@ -7869,6 +9191,147 @@
               </a:rPr>
               <a:pPr/>
               <a:t>2</a:t>
+            </a:fld>
+            <a:endParaRPr lang="sv-SE">
+              <a:solidFill>
+                <a:srgbClr val="50B4C8">
+                  <a:alpha val="25000"/>
+                </a:srgbClr>
+              </a:solidFill>
+            </a:endParaRPr>
+          </a:p>
+        </p:txBody>
+      </p:sp>
+      <p:pic>
+        <p:nvPicPr>
+          <p:cNvPr id="36" name="Image 35"/>
+          <p:cNvPicPr>
+            <a:picLocks noChangeAspect="1"/>
+          </p:cNvPicPr>
+          <p:nvPr/>
+        </p:nvPicPr>
+        <p:blipFill>
+          <a:blip r:embed="rId5">
+            <a:extLst>
+              <a:ext uri="{28A0092B-C50C-407E-A947-70E740481C1C}">
+                <a14:useLocalDpi xmlns:a14="http://schemas.microsoft.com/office/drawing/2010/main" val="0"/>
+              </a:ext>
+            </a:extLst>
+          </a:blip>
+          <a:stretch>
+            <a:fillRect/>
+          </a:stretch>
+        </p:blipFill>
+        <p:spPr>
+          <a:xfrm>
+            <a:off x="6043611" y="1374655"/>
+            <a:ext cx="3508030" cy="841927"/>
+          </a:xfrm>
+          <a:prstGeom prst="rect">
+            <a:avLst/>
+          </a:prstGeom>
+        </p:spPr>
+      </p:pic>
+      <p:pic>
+        <p:nvPicPr>
+          <p:cNvPr id="41" name="Image 40"/>
+          <p:cNvPicPr>
+            <a:picLocks noChangeAspect="1"/>
+          </p:cNvPicPr>
+          <p:nvPr/>
+        </p:nvPicPr>
+        <p:blipFill>
+          <a:blip r:embed="rId6" cstate="print">
+            <a:extLst>
+              <a:ext uri="{28A0092B-C50C-407E-A947-70E740481C1C}">
+                <a14:useLocalDpi xmlns:a14="http://schemas.microsoft.com/office/drawing/2010/main" val="0"/>
+              </a:ext>
+            </a:extLst>
+          </a:blip>
+          <a:stretch>
+            <a:fillRect/>
+          </a:stretch>
+        </p:blipFill>
+        <p:spPr>
+          <a:xfrm>
+            <a:off x="722311" y="1295614"/>
+            <a:ext cx="3655199" cy="1000007"/>
+          </a:xfrm>
+          <a:prstGeom prst="rect">
+            <a:avLst/>
+          </a:prstGeom>
+        </p:spPr>
+      </p:pic>
+    </p:spTree>
+    <p:extLst>
+      <p:ext uri="{BB962C8B-B14F-4D97-AF65-F5344CB8AC3E}">
+        <p14:creationId xmlns:p14="http://schemas.microsoft.com/office/powerpoint/2010/main" val="3097995210"/>
+      </p:ext>
+    </p:extLst>
+  </p:cSld>
+  <p:clrMapOvr>
+    <a:masterClrMapping/>
+  </p:clrMapOvr>
+  <mc:AlternateContent xmlns:mc="http://schemas.openxmlformats.org/markup-compatibility/2006" xmlns:p14="http://schemas.microsoft.com/office/powerpoint/2010/main">
+    <mc:Choice Requires="p14">
+      <p:transition spd="slow" p14:dur="2000"/>
+    </mc:Choice>
+    <mc:Fallback xmlns="">
+      <p:transition spd="slow"/>
+    </mc:Fallback>
+  </mc:AlternateContent>
+  <p:timing>
+    <p:tnLst>
+      <p:par>
+        <p:cTn id="1" dur="indefinite" restart="never" nodeType="tmRoot"/>
+      </p:par>
+    </p:tnLst>
+  </p:timing>
+</p:sld>
+</file>
+
+<file path=ppt/slides/slide3.xml><?xml version="1.0" encoding="utf-8"?>
+<p:sld xmlns:a="http://schemas.openxmlformats.org/drawingml/2006/main" xmlns:r="http://schemas.openxmlformats.org/officeDocument/2006/relationships" xmlns:p="http://schemas.openxmlformats.org/presentationml/2006/main">
+  <p:cSld>
+    <p:spTree>
+      <p:nvGrpSpPr>
+        <p:cNvPr id="1" name=""/>
+        <p:cNvGrpSpPr/>
+        <p:nvPr/>
+      </p:nvGrpSpPr>
+      <p:grpSpPr>
+        <a:xfrm>
+          <a:off x="0" y="0"/>
+          <a:ext cx="0" cy="0"/>
+          <a:chOff x="0" y="0"/>
+          <a:chExt cx="0" cy="0"/>
+        </a:xfrm>
+      </p:grpSpPr>
+      <p:sp>
+        <p:nvSpPr>
+          <p:cNvPr id="4" name="Espace réservé du numéro de diapositive 3"/>
+          <p:cNvSpPr>
+            <a:spLocks noGrp="1"/>
+          </p:cNvSpPr>
+          <p:nvPr>
+            <p:ph type="sldNum" sz="quarter" idx="12"/>
+          </p:nvPr>
+        </p:nvSpPr>
+        <p:spPr/>
+        <p:txBody>
+          <a:bodyPr/>
+          <a:lstStyle/>
+          <a:p>
+            <a:fld id="{1C87DF0D-C636-4B76-8D76-63B9335EBD46}" type="slidenum">
+              <a:rPr lang="sv-SE" smtClean="0">
+                <a:solidFill>
+                  <a:srgbClr val="50B4C8">
+                    <a:alpha val="25000"/>
+                  </a:srgbClr>
+                </a:solidFill>
+              </a:rPr>
+              <a:pPr/>
+              <a:t>3</a:t>
             </a:fld>
             <a:endParaRPr lang="sv-SE">
               <a:solidFill>
@@ -8187,240 +9650,6 @@
 </p:sld>
 </file>
 
-<file path=ppt/slides/slide3.xml><?xml version="1.0" encoding="utf-8"?>
-<p:sld xmlns:a="http://schemas.openxmlformats.org/drawingml/2006/main" xmlns:r="http://schemas.openxmlformats.org/officeDocument/2006/relationships" xmlns:p="http://schemas.openxmlformats.org/presentationml/2006/main">
-  <p:cSld>
-    <p:spTree>
-      <p:nvGrpSpPr>
-        <p:cNvPr id="1" name=""/>
-        <p:cNvGrpSpPr/>
-        <p:nvPr/>
-      </p:nvGrpSpPr>
-      <p:grpSpPr>
-        <a:xfrm>
-          <a:off x="0" y="0"/>
-          <a:ext cx="0" cy="0"/>
-          <a:chOff x="0" y="0"/>
-          <a:chExt cx="0" cy="0"/>
-        </a:xfrm>
-      </p:grpSpPr>
-      <p:sp>
-        <p:nvSpPr>
-          <p:cNvPr id="2" name="Titre 1"/>
-          <p:cNvSpPr>
-            <a:spLocks noGrp="1"/>
-          </p:cNvSpPr>
-          <p:nvPr>
-            <p:ph type="title"/>
-          </p:nvPr>
-        </p:nvSpPr>
-        <p:spPr>
-          <a:xfrm>
-            <a:off x="657224" y="-204"/>
-            <a:ext cx="10772775" cy="1658198"/>
-          </a:xfrm>
-        </p:spPr>
-        <p:txBody>
-          <a:bodyPr/>
-          <a:lstStyle/>
-          <a:p>
-            <a:r>
-              <a:rPr lang="fr-FR" dirty="0" smtClean="0"/>
-              <a:t>Existant</a:t>
-            </a:r>
-            <a:endParaRPr lang="fr-FR" dirty="0">
-              <a:solidFill>
-                <a:schemeClr val="tx1">
-                  <a:lumMod val="50000"/>
-                  <a:lumOff val="50000"/>
-                </a:schemeClr>
-              </a:solidFill>
-            </a:endParaRPr>
-          </a:p>
-        </p:txBody>
-      </p:sp>
-      <p:pic>
-        <p:nvPicPr>
-          <p:cNvPr id="7" name="Espace réservé du contenu 6"/>
-          <p:cNvPicPr>
-            <a:picLocks noGrp="1" noChangeAspect="1"/>
-          </p:cNvPicPr>
-          <p:nvPr>
-            <p:ph sz="half" idx="2"/>
-          </p:nvPr>
-        </p:nvPicPr>
-        <p:blipFill>
-          <a:blip r:embed="rId3">
-            <a:extLst>
-              <a:ext uri="{28A0092B-C50C-407E-A947-70E740481C1C}">
-                <a14:useLocalDpi xmlns:a14="http://schemas.microsoft.com/office/drawing/2010/main" val="0"/>
-              </a:ext>
-            </a:extLst>
-          </a:blip>
-          <a:stretch>
-            <a:fillRect/>
-          </a:stretch>
-        </p:blipFill>
-        <p:spPr>
-          <a:xfrm>
-            <a:off x="722311" y="2319663"/>
-            <a:ext cx="4891679" cy="3281501"/>
-          </a:xfrm>
-        </p:spPr>
-      </p:pic>
-      <p:pic>
-        <p:nvPicPr>
-          <p:cNvPr id="12" name="Espace réservé du contenu 11"/>
-          <p:cNvPicPr>
-            <a:picLocks noGrp="1" noChangeAspect="1"/>
-          </p:cNvPicPr>
-          <p:nvPr>
-            <p:ph sz="quarter" idx="4"/>
-          </p:nvPr>
-        </p:nvPicPr>
-        <p:blipFill>
-          <a:blip r:embed="rId4">
-            <a:extLst>
-              <a:ext uri="{28A0092B-C50C-407E-A947-70E740481C1C}">
-                <a14:useLocalDpi xmlns:a14="http://schemas.microsoft.com/office/drawing/2010/main" val="0"/>
-              </a:ext>
-            </a:extLst>
-          </a:blip>
-          <a:stretch>
-            <a:fillRect/>
-          </a:stretch>
-        </p:blipFill>
-        <p:spPr>
-          <a:xfrm>
-            <a:off x="6007100" y="2319663"/>
-            <a:ext cx="5871472" cy="3281500"/>
-          </a:xfrm>
-        </p:spPr>
-      </p:pic>
-      <p:sp>
-        <p:nvSpPr>
-          <p:cNvPr id="4" name="Espace réservé du numéro de diapositive 3"/>
-          <p:cNvSpPr>
-            <a:spLocks noGrp="1"/>
-          </p:cNvSpPr>
-          <p:nvPr>
-            <p:ph type="sldNum" sz="quarter" idx="12"/>
-          </p:nvPr>
-        </p:nvSpPr>
-        <p:spPr/>
-        <p:txBody>
-          <a:bodyPr/>
-          <a:lstStyle/>
-          <a:p>
-            <a:fld id="{1C87DF0D-C636-4B76-8D76-63B9335EBD46}" type="slidenum">
-              <a:rPr lang="sv-SE" smtClean="0">
-                <a:solidFill>
-                  <a:srgbClr val="50B4C8">
-                    <a:alpha val="25000"/>
-                  </a:srgbClr>
-                </a:solidFill>
-              </a:rPr>
-              <a:pPr/>
-              <a:t>3</a:t>
-            </a:fld>
-            <a:endParaRPr lang="sv-SE">
-              <a:solidFill>
-                <a:srgbClr val="50B4C8">
-                  <a:alpha val="25000"/>
-                </a:srgbClr>
-              </a:solidFill>
-            </a:endParaRPr>
-          </a:p>
-        </p:txBody>
-      </p:sp>
-      <p:pic>
-        <p:nvPicPr>
-          <p:cNvPr id="36" name="Image 35"/>
-          <p:cNvPicPr>
-            <a:picLocks noChangeAspect="1"/>
-          </p:cNvPicPr>
-          <p:nvPr/>
-        </p:nvPicPr>
-        <p:blipFill>
-          <a:blip r:embed="rId5">
-            <a:extLst>
-              <a:ext uri="{28A0092B-C50C-407E-A947-70E740481C1C}">
-                <a14:useLocalDpi xmlns:a14="http://schemas.microsoft.com/office/drawing/2010/main" val="0"/>
-              </a:ext>
-            </a:extLst>
-          </a:blip>
-          <a:stretch>
-            <a:fillRect/>
-          </a:stretch>
-        </p:blipFill>
-        <p:spPr>
-          <a:xfrm>
-            <a:off x="6043611" y="1374655"/>
-            <a:ext cx="3508030" cy="841927"/>
-          </a:xfrm>
-          <a:prstGeom prst="rect">
-            <a:avLst/>
-          </a:prstGeom>
-        </p:spPr>
-      </p:pic>
-      <p:pic>
-        <p:nvPicPr>
-          <p:cNvPr id="41" name="Image 40"/>
-          <p:cNvPicPr>
-            <a:picLocks noChangeAspect="1"/>
-          </p:cNvPicPr>
-          <p:nvPr/>
-        </p:nvPicPr>
-        <p:blipFill>
-          <a:blip r:embed="rId6" cstate="print">
-            <a:extLst>
-              <a:ext uri="{28A0092B-C50C-407E-A947-70E740481C1C}">
-                <a14:useLocalDpi xmlns:a14="http://schemas.microsoft.com/office/drawing/2010/main" val="0"/>
-              </a:ext>
-            </a:extLst>
-          </a:blip>
-          <a:stretch>
-            <a:fillRect/>
-          </a:stretch>
-        </p:blipFill>
-        <p:spPr>
-          <a:xfrm>
-            <a:off x="722311" y="1295614"/>
-            <a:ext cx="3655199" cy="1000007"/>
-          </a:xfrm>
-          <a:prstGeom prst="rect">
-            <a:avLst/>
-          </a:prstGeom>
-        </p:spPr>
-      </p:pic>
-    </p:spTree>
-    <p:extLst>
-      <p:ext uri="{BB962C8B-B14F-4D97-AF65-F5344CB8AC3E}">
-        <p14:creationId xmlns:p14="http://schemas.microsoft.com/office/powerpoint/2010/main" val="3097995210"/>
-      </p:ext>
-    </p:extLst>
-  </p:cSld>
-  <p:clrMapOvr>
-    <a:masterClrMapping/>
-  </p:clrMapOvr>
-  <mc:AlternateContent xmlns:mc="http://schemas.openxmlformats.org/markup-compatibility/2006" xmlns:p14="http://schemas.microsoft.com/office/powerpoint/2010/main">
-    <mc:Choice Requires="p14">
-      <p:transition spd="slow" p14:dur="2000"/>
-    </mc:Choice>
-    <mc:Fallback xmlns="">
-      <p:transition spd="slow"/>
-    </mc:Fallback>
-  </mc:AlternateContent>
-  <p:timing>
-    <p:tnLst>
-      <p:par>
-        <p:cTn id="1" dur="indefinite" restart="never" nodeType="tmRoot"/>
-      </p:par>
-    </p:tnLst>
-  </p:timing>
-</p:sld>
-</file>
-
 <file path=ppt/slides/slide4.xml><?xml version="1.0" encoding="utf-8"?>
 <p:sld xmlns:a="http://schemas.openxmlformats.org/drawingml/2006/main" xmlns:r="http://schemas.openxmlformats.org/officeDocument/2006/relationships" xmlns:p="http://schemas.openxmlformats.org/presentationml/2006/main">
   <p:cSld>
@@ -8516,13 +9745,13 @@
           <p:nvPr>
             <p:extLst>
               <p:ext uri="{D42A27DB-BD31-4B8C-83A1-F6EECF244321}">
-                <p14:modId xmlns:p14="http://schemas.microsoft.com/office/powerpoint/2010/main" val="2480118593"/>
+                <p14:modId xmlns:p14="http://schemas.microsoft.com/office/powerpoint/2010/main" val="4182434428"/>
               </p:ext>
             </p:extLst>
           </p:nvPr>
         </p:nvGraphicFramePr>
         <p:xfrm>
-          <a:off x="1854196" y="377457"/>
+          <a:off x="3569658" y="260251"/>
           <a:ext cx="8526130" cy="6060558"/>
         </p:xfrm>
         <a:graphic>
@@ -8553,7 +9782,7 @@
         </p:blipFill>
         <p:spPr>
           <a:xfrm>
-            <a:off x="5302097" y="2698899"/>
+            <a:off x="7017559" y="2581693"/>
             <a:ext cx="1630327" cy="1630327"/>
           </a:xfrm>
           <a:prstGeom prst="rect">
@@ -8561,6 +9790,129 @@
           </a:prstGeom>
         </p:spPr>
       </p:pic>
+      <p:sp>
+        <p:nvSpPr>
+          <p:cNvPr id="3" name="ZoneTexte 2"/>
+          <p:cNvSpPr txBox="1"/>
+          <p:nvPr/>
+        </p:nvSpPr>
+        <p:spPr>
+          <a:xfrm>
+            <a:off x="735724" y="1657994"/>
+            <a:ext cx="2755434" cy="4662815"/>
+          </a:xfrm>
+          <a:prstGeom prst="rect">
+            <a:avLst/>
+          </a:prstGeom>
+          <a:noFill/>
+        </p:spPr>
+        <p:txBody>
+          <a:bodyPr wrap="none" rtlCol="0">
+            <a:spAutoFit/>
+          </a:bodyPr>
+          <a:lstStyle/>
+          <a:p>
+            <a:pPr>
+              <a:lnSpc>
+                <a:spcPct val="150000"/>
+              </a:lnSpc>
+              <a:tabLst>
+                <a:tab pos="1439863" algn="l"/>
+              </a:tabLst>
+            </a:pPr>
+            <a:r>
+              <a:rPr lang="fr-FR" dirty="0" smtClean="0"/>
+              <a:t>8 GTFS / agences importées</a:t>
+            </a:r>
+          </a:p>
+          <a:p>
+            <a:pPr>
+              <a:lnSpc>
+                <a:spcPct val="150000"/>
+              </a:lnSpc>
+            </a:pPr>
+            <a:r>
+              <a:rPr lang="fr-FR" dirty="0" smtClean="0"/>
+              <a:t>8 000 000 stop times</a:t>
+            </a:r>
+          </a:p>
+          <a:p>
+            <a:pPr>
+              <a:lnSpc>
+                <a:spcPct val="150000"/>
+              </a:lnSpc>
+            </a:pPr>
+            <a:endParaRPr lang="fr-FR" dirty="0"/>
+          </a:p>
+          <a:p>
+            <a:pPr>
+              <a:lnSpc>
+                <a:spcPct val="150000"/>
+              </a:lnSpc>
+            </a:pPr>
+            <a:endParaRPr lang="fr-FR" dirty="0" smtClean="0"/>
+          </a:p>
+          <a:p>
+            <a:pPr>
+              <a:lnSpc>
+                <a:spcPct val="150000"/>
+              </a:lnSpc>
+            </a:pPr>
+            <a:endParaRPr lang="fr-FR" dirty="0"/>
+          </a:p>
+          <a:p>
+            <a:pPr>
+              <a:lnSpc>
+                <a:spcPct val="150000"/>
+              </a:lnSpc>
+            </a:pPr>
+            <a:endParaRPr lang="fr-FR" dirty="0" smtClean="0"/>
+          </a:p>
+          <a:p>
+            <a:pPr>
+              <a:lnSpc>
+                <a:spcPct val="150000"/>
+              </a:lnSpc>
+            </a:pPr>
+            <a:endParaRPr lang="fr-FR" dirty="0"/>
+          </a:p>
+          <a:p>
+            <a:pPr>
+              <a:lnSpc>
+                <a:spcPct val="150000"/>
+              </a:lnSpc>
+            </a:pPr>
+            <a:endParaRPr lang="fr-FR" dirty="0" smtClean="0"/>
+          </a:p>
+          <a:p>
+            <a:pPr>
+              <a:lnSpc>
+                <a:spcPct val="150000"/>
+              </a:lnSpc>
+            </a:pPr>
+            <a:endParaRPr lang="fr-FR" dirty="0"/>
+          </a:p>
+          <a:p>
+            <a:pPr>
+              <a:lnSpc>
+                <a:spcPct val="150000"/>
+              </a:lnSpc>
+            </a:pPr>
+            <a:r>
+              <a:rPr lang="fr-FR" dirty="0" smtClean="0"/>
+              <a:t>possibilité simple</a:t>
+            </a:r>
+            <a:br>
+              <a:rPr lang="fr-FR" dirty="0" smtClean="0"/>
+            </a:br>
+            <a:r>
+              <a:rPr lang="fr-FR" dirty="0" smtClean="0"/>
+              <a:t>d’ajout de nouveaux GTFS</a:t>
+            </a:r>
+            <a:endParaRPr lang="fr-FR" dirty="0"/>
+          </a:p>
+        </p:txBody>
+      </p:sp>
     </p:spTree>
     <p:extLst>
       <p:ext uri="{BB962C8B-B14F-4D97-AF65-F5344CB8AC3E}">
@@ -8696,14 +10048,16 @@
             </a:r>
           </a:p>
           <a:p>
-            <a:r>
-              <a:rPr lang="fr-FR" dirty="0" smtClean="0"/>
+            <a:pPr lvl="1"/>
+            <a:r>
+              <a:rPr lang="fr-FR" sz="2400" dirty="0" smtClean="0"/>
               <a:t>en tout temps</a:t>
             </a:r>
           </a:p>
           <a:p>
-            <a:r>
-              <a:rPr lang="fr-FR" dirty="0" smtClean="0"/>
+            <a:pPr lvl="1"/>
+            <a:r>
+              <a:rPr lang="fr-FR" sz="2400" dirty="0" smtClean="0"/>
               <a:t>en tout lieux</a:t>
             </a:r>
             <a:endParaRPr lang="fr-FR" dirty="0"/>

</xml_diff>